<commit_message>
PowerPoint presentation updated for current solution
</commit_message>
<xml_diff>
--- a/ResumeAsAnAPI.pptx
+++ b/ResumeAsAnAPI.pptx
@@ -1140,7 +1140,6 @@
               <a:rPr lang="en-US" noProof="0" smtClean="0"/>
               <a:t>Click to edit Master title style</a:t>
             </a:r>
-            <a:endParaRPr lang="en-US" noProof="0" smtClean="0"/>
           </a:p>
         </p:txBody>
       </p:sp>
@@ -1179,7 +1178,6 @@
               <a:rPr lang="en-US" noProof="0" smtClean="0"/>
               <a:t>Click to edit Master subtitle style</a:t>
             </a:r>
-            <a:endParaRPr lang="en-US" noProof="0" smtClean="0"/>
           </a:p>
         </p:txBody>
       </p:sp>
@@ -3642,7 +3640,6 @@
               <a:rPr lang="en-US" smtClean="0"/>
               <a:t>Click to edit Master title style</a:t>
             </a:r>
-            <a:endParaRPr lang="en-US" smtClean="0"/>
           </a:p>
         </p:txBody>
       </p:sp>
@@ -3739,7 +3736,6 @@
               <a:rPr lang="en-US" smtClean="0"/>
               <a:t>Fifth level</a:t>
             </a:r>
-            <a:endParaRPr lang="en-US" smtClean="0"/>
           </a:p>
         </p:txBody>
       </p:sp>
@@ -4697,7 +4693,11 @@
           <a:p>
             <a:r>
               <a:rPr lang="en-US" dirty="0" smtClean="0"/>
-              <a:t>Has anyone done this before?</a:t>
+              <a:t>Has </a:t>
+            </a:r>
+            <a:r>
+              <a:rPr lang="en-US" dirty="0" smtClean="0"/>
+              <a:t>anyone done this before?</a:t>
             </a:r>
             <a:endParaRPr lang="en-US" dirty="0"/>
           </a:p>
@@ -4705,68 +4705,25 @@
             <a:pPr lvl="1"/>
             <a:r>
               <a:rPr lang="en-US" dirty="0" smtClean="0"/>
-              <a:t>A similar approach to this concept is available </a:t>
-            </a:r>
-            <a:r>
-              <a:rPr lang="en-US" dirty="0" smtClean="0">
-                <a:hlinkClick r:id="rId2"/>
-              </a:rPr>
-              <a:t>here</a:t>
-            </a:r>
+              <a:t>JSON Resume is an open source project designed to host and share resumes in a JSON object format</a:t>
+            </a:r>
+            <a:endParaRPr lang="en-US" dirty="0" smtClean="0"/>
+          </a:p>
+          <a:p>
+            <a:pPr lvl="1"/>
             <a:r>
               <a:rPr lang="en-US" dirty="0" smtClean="0"/>
-              <a:t>.  This approach takes a resume as a JSON object and posts it to an XML style format called HRXML</a:t>
-            </a:r>
+              <a:t>Sample resumes are available in this format to test API functions</a:t>
+            </a:r>
+            <a:endParaRPr lang="en-US" dirty="0"/>
           </a:p>
           <a:p>
             <a:pPr lvl="1"/>
             <a:r>
               <a:rPr lang="en-US" dirty="0" smtClean="0"/>
-              <a:t>XML based solutions are great for deep hierarchy, contextual schema, and tool based querying and modification via </a:t>
-            </a:r>
-            <a:r>
-              <a:rPr lang="en-US" dirty="0" err="1" smtClean="0"/>
-              <a:t>Xpath</a:t>
-            </a:r>
-            <a:r>
-              <a:rPr lang="en-US" dirty="0" smtClean="0"/>
-              <a:t> and XSL</a:t>
-            </a:r>
-          </a:p>
-          <a:p>
-            <a:pPr lvl="1"/>
-            <a:r>
-              <a:rPr lang="en-US" dirty="0" smtClean="0"/>
-              <a:t>JSON is easier to use directly via deserialization and “big data” techniques (filter, map, reduce), and is also lighter weight and simpler.  Perhaps we can just </a:t>
-            </a:r>
-            <a:r>
-              <a:rPr lang="en-US" dirty="0" smtClean="0"/>
-              <a:t>use this directly?</a:t>
-            </a:r>
-          </a:p>
-          <a:p>
-            <a:pPr lvl="1"/>
-            <a:r>
-              <a:rPr lang="en-US" dirty="0" smtClean="0"/>
-              <a:t>Also, it’s the 21</a:t>
-            </a:r>
-            <a:r>
-              <a:rPr lang="en-US" baseline="30000" dirty="0" smtClean="0"/>
-              <a:t>st</a:t>
-            </a:r>
-            <a:r>
-              <a:rPr lang="en-US" dirty="0" smtClean="0"/>
-              <a:t> century.  </a:t>
-            </a:r>
-            <a:r>
-              <a:rPr lang="en-US" b="1" dirty="0" smtClean="0"/>
-              <a:t>Nobody</a:t>
-            </a:r>
-            <a:r>
-              <a:rPr lang="en-US" dirty="0" smtClean="0"/>
-              <a:t> has a pager anymore.  Perhaps some of these fields should be modified to reflect modern resume requirements.</a:t>
-            </a:r>
-            <a:endParaRPr lang="en-US" dirty="0"/>
+              <a:t>The object size is larger than necessary for many resumes, but using a standardized format instead of creating one makes the project compatible with other work in the future</a:t>
+            </a:r>
+            <a:endParaRPr lang="en-US" dirty="0" smtClean="0"/>
           </a:p>
         </p:txBody>
       </p:sp>
@@ -4842,7 +4799,11 @@
           <a:p>
             <a:r>
               <a:rPr lang="en-US" dirty="0" smtClean="0"/>
-              <a:t>The solution consists of an API, endpoint, and JSON object of a resume</a:t>
+              <a:t>The solution consists of </a:t>
+            </a:r>
+            <a:r>
+              <a:rPr lang="en-US" dirty="0" smtClean="0"/>
+              <a:t>a cloud hosted API and a non-relational database to serve data</a:t>
             </a:r>
             <a:endParaRPr lang="en-US" dirty="0"/>
           </a:p>
@@ -4850,39 +4811,58 @@
             <a:pPr lvl="1"/>
             <a:r>
               <a:rPr lang="en-US" dirty="0" smtClean="0"/>
-              <a:t>The API includes functions for name, address, cell phone, work phone, website, repository (</a:t>
-            </a:r>
+              <a:t>The API </a:t>
+            </a:r>
+            <a:r>
+              <a:rPr lang="en-US" dirty="0" smtClean="0"/>
+              <a:t>endpoint is available at </a:t>
+            </a:r>
+            <a:r>
+              <a:rPr lang="en-US" u="sng" dirty="0">
+                <a:hlinkClick r:id="rId2"/>
+              </a:rPr>
+              <a:t>http://</a:t>
+            </a:r>
+            <a:r>
+              <a:rPr lang="en-US" u="sng" dirty="0" smtClean="0">
+                <a:hlinkClick r:id="rId2"/>
+              </a:rPr>
+              <a:t>54.68.92.141:3001/resumes</a:t>
+            </a:r>
+            <a:endParaRPr lang="en-US" dirty="0" smtClean="0"/>
+          </a:p>
+          <a:p>
+            <a:pPr lvl="1"/>
+            <a:r>
+              <a:rPr lang="en-US" dirty="0" smtClean="0"/>
+              <a:t>The hosting is done via an Amazon EC2 instance</a:t>
+            </a:r>
+          </a:p>
+          <a:p>
+            <a:pPr lvl="1"/>
+            <a:r>
+              <a:rPr lang="en-US" dirty="0" smtClean="0"/>
+              <a:t>The application is coded in Node.js, using </a:t>
+            </a:r>
+            <a:r>
+              <a:rPr lang="en-US" dirty="0"/>
+              <a:t>E</a:t>
+            </a:r>
+            <a:r>
+              <a:rPr lang="en-US" dirty="0" smtClean="0"/>
+              <a:t>xpress framework</a:t>
+            </a:r>
+          </a:p>
+          <a:p>
+            <a:pPr lvl="1"/>
             <a:r>
               <a:rPr lang="en-US" dirty="0" err="1" smtClean="0"/>
-              <a:t>GitHub</a:t>
+              <a:t>MongoDB</a:t>
             </a:r>
             <a:r>
               <a:rPr lang="en-US" dirty="0" smtClean="0"/>
-              <a:t>, </a:t>
-            </a:r>
-            <a:r>
-              <a:rPr lang="en-US" dirty="0" err="1" smtClean="0"/>
-              <a:t>BitBucket</a:t>
-            </a:r>
-            <a:r>
-              <a:rPr lang="en-US" dirty="0" smtClean="0"/>
-              <a:t>, etc.), objective statement, education, and positions.</a:t>
-            </a:r>
-          </a:p>
-          <a:p>
-            <a:pPr lvl="1"/>
-            <a:r>
-              <a:rPr lang="en-US" dirty="0" smtClean="0"/>
-              <a:t>The endpoint is an AWS hosted, form based web page with buttons to show and hide different sections of the resume using the API</a:t>
-            </a:r>
-          </a:p>
-          <a:p>
-            <a:pPr lvl="1"/>
-            <a:r>
-              <a:rPr lang="en-US" dirty="0" smtClean="0"/>
-              <a:t>The JSON object is stored as a plain file for this exercise, since only one object is necessary for this particular application.</a:t>
-            </a:r>
-            <a:endParaRPr lang="en-US" dirty="0"/>
+              <a:t> was chosen for a database in order to explore non-relational database concepts</a:t>
+            </a:r>
           </a:p>
         </p:txBody>
       </p:sp>
@@ -4958,20 +4938,43 @@
           <a:p>
             <a:r>
               <a:rPr lang="en-US" dirty="0" smtClean="0"/>
-              <a:t>This solution is designed to work with one resume as a single JSON object file.</a:t>
-            </a:r>
-          </a:p>
-          <a:p>
+              <a:t>This solution is designed to work </a:t>
+            </a:r>
             <a:r>
               <a:rPr lang="en-US" dirty="0" smtClean="0"/>
-              <a:t>A “scale-out” plan would include a database (non-relational could be used if needed) and filtering functions to obtain desired data</a:t>
-            </a:r>
-          </a:p>
-          <a:p>
+              <a:t>with resumes </a:t>
+            </a:r>
             <a:r>
               <a:rPr lang="en-US" dirty="0" smtClean="0"/>
-              <a:t>An “i18n” solution may need to store images, since many countries include them in resumes.</a:t>
-            </a:r>
+              <a:t>using traditional CRUD functionality</a:t>
+            </a:r>
+          </a:p>
+          <a:p>
+            <a:r>
+              <a:rPr lang="en-US" dirty="0" smtClean="0"/>
+              <a:t>For usability, the </a:t>
+            </a:r>
+            <a:r>
+              <a:rPr lang="en-US" dirty="0" smtClean="0"/>
+              <a:t>API could include wrappers around the update() function to change specific parameters in the resume easily (e.g. </a:t>
+            </a:r>
+            <a:r>
+              <a:rPr lang="en-US" dirty="0" err="1" smtClean="0"/>
+              <a:t>updateAddress</a:t>
+            </a:r>
+            <a:r>
+              <a:rPr lang="en-US" dirty="0" smtClean="0"/>
+              <a:t>(), </a:t>
+            </a:r>
+            <a:r>
+              <a:rPr lang="en-US" dirty="0" err="1" smtClean="0"/>
+              <a:t>newJob</a:t>
+            </a:r>
+            <a:r>
+              <a:rPr lang="en-US" dirty="0" smtClean="0"/>
+              <a:t>())</a:t>
+            </a:r>
+            <a:endParaRPr lang="en-US" dirty="0" smtClean="0"/>
           </a:p>
           <a:p>
             <a:r>
@@ -4984,7 +4987,17 @@
             </a:r>
             <a:r>
               <a:rPr lang="en-US" dirty="0" smtClean="0"/>
-              <a:t>, Word) could be useful for other needs.</a:t>
+              <a:t>, Word) could be useful for other needs</a:t>
+            </a:r>
+            <a:r>
+              <a:rPr lang="en-US" dirty="0" smtClean="0"/>
+              <a:t>.</a:t>
+            </a:r>
+          </a:p>
+          <a:p>
+            <a:r>
+              <a:rPr lang="en-US" dirty="0" smtClean="0"/>
+              <a:t>The JSON object could be partially presented, as a “business card” or “Rolodex entry” </a:t>
             </a:r>
             <a:endParaRPr lang="en-US" dirty="0"/>
           </a:p>

</xml_diff>